<commit_message>
added conclusion and change diagram
made some changes
</commit_message>
<xml_diff>
--- a/Poster Enterprise Software Framework CA 1.pptx
+++ b/Poster Enterprise Software Framework CA 1.pptx
@@ -160,7 +160,7 @@
             <a:srgbClr val="A4A3A4"/>
           </p15:clr>
         </p15:guide>
-        <p15:guide id="5" orient="horz" pos="3211">
+        <p15:guide id="5" orient="horz" pos="3209" userDrawn="1">
           <p15:clr>
             <a:srgbClr val="A4A3A4"/>
           </p15:clr>
@@ -5087,10 +5087,10 @@
         </p:nvGrpSpPr>
         <p:grpSpPr bwMode="auto">
           <a:xfrm>
-            <a:off x="692944" y="12231111"/>
-            <a:ext cx="13333412" cy="1709120"/>
-            <a:chOff x="1192686" y="15951774"/>
-            <a:chExt cx="13029556" cy="5256909"/>
+            <a:off x="835099" y="11887270"/>
+            <a:ext cx="13191257" cy="2052961"/>
+            <a:chOff x="1331601" y="16229020"/>
+            <a:chExt cx="12890641" cy="4979663"/>
           </a:xfrm>
         </p:grpSpPr>
         <p:sp>
@@ -5285,8 +5285,8 @@
           </p:nvCxnSpPr>
           <p:spPr bwMode="auto">
             <a:xfrm flipV="1">
-              <a:off x="1192686" y="15951774"/>
-              <a:ext cx="12745514" cy="1"/>
+              <a:off x="1346021" y="16229020"/>
+              <a:ext cx="12745514" cy="0"/>
             </a:xfrm>
             <a:prstGeom prst="line">
               <a:avLst/>
@@ -5366,7 +5366,7 @@
         </p:nvSpPr>
         <p:spPr bwMode="auto">
           <a:xfrm>
-            <a:off x="835099" y="6383701"/>
+            <a:off x="776126" y="6202401"/>
             <a:ext cx="13042746" cy="5217819"/>
           </a:xfrm>
           <a:prstGeom prst="rect">
@@ -5706,8 +5706,8 @@
         </p:nvSpPr>
         <p:spPr bwMode="auto">
           <a:xfrm>
-            <a:off x="14971712" y="23096087"/>
-            <a:ext cx="12787313" cy="517525"/>
+            <a:off x="14978751" y="22697402"/>
+            <a:ext cx="12337653" cy="489365"/>
           </a:xfrm>
           <a:prstGeom prst="rect">
             <a:avLst/>
@@ -5737,7 +5737,7 @@
           </a:extLst>
         </p:spPr>
         <p:txBody>
-          <a:bodyPr>
+          <a:bodyPr wrap="square">
             <a:spAutoFit/>
           </a:bodyPr>
           <a:lstStyle>
@@ -6046,7 +6046,7 @@
         </p:nvSpPr>
         <p:spPr bwMode="auto">
           <a:xfrm>
-            <a:off x="14902397" y="14878509"/>
+            <a:off x="14978751" y="14611351"/>
             <a:ext cx="12660312" cy="8045450"/>
           </a:xfrm>
           <a:prstGeom prst="rect">
@@ -6369,7 +6369,7 @@
         </p:nvSpPr>
         <p:spPr bwMode="auto">
           <a:xfrm>
-            <a:off x="28943300" y="6221413"/>
+            <a:off x="29174151" y="22631681"/>
             <a:ext cx="12787313" cy="3898900"/>
           </a:xfrm>
           <a:prstGeom prst="rect">
@@ -6503,10 +6503,10 @@
         </p:nvGrpSpPr>
         <p:grpSpPr bwMode="auto">
           <a:xfrm>
-            <a:off x="14818808" y="4818788"/>
-            <a:ext cx="12940217" cy="1348967"/>
+            <a:off x="14681741" y="4777453"/>
+            <a:ext cx="12912185" cy="995644"/>
             <a:chOff x="15019206" y="5195636"/>
-            <a:chExt cx="12941592" cy="1912842"/>
+            <a:chExt cx="12913557" cy="1411828"/>
           </a:xfrm>
         </p:grpSpPr>
         <p:sp>
@@ -6525,7 +6525,7 @@
           </p:nvSpPr>
           <p:spPr bwMode="auto">
             <a:xfrm>
-              <a:off x="15073691" y="5730177"/>
+              <a:off x="15045656" y="5229163"/>
               <a:ext cx="12887107" cy="1378301"/>
             </a:xfrm>
             <a:prstGeom prst="rect">
@@ -6742,8 +6742,8 @@
         </p:nvSpPr>
         <p:spPr bwMode="auto">
           <a:xfrm>
-            <a:off x="28946475" y="27857450"/>
-            <a:ext cx="12306300" cy="803275"/>
+            <a:off x="29186396" y="20419516"/>
+            <a:ext cx="12417216" cy="783741"/>
           </a:xfrm>
           <a:prstGeom prst="rect">
             <a:avLst/>
@@ -6773,7 +6773,7 @@
           </a:extLst>
         </p:spPr>
         <p:txBody>
-          <a:bodyPr>
+          <a:bodyPr wrap="square">
             <a:spAutoFit/>
           </a:bodyPr>
           <a:lstStyle>
@@ -6893,12 +6893,12 @@
               </a:spcAft>
             </a:pPr>
             <a:r>
-              <a:rPr lang="en-GB" altLang="en-US" sz="3600" b="1">
+              <a:rPr lang="en-GB" altLang="en-US" sz="3600" b="1" dirty="0">
                 <a:cs typeface="Arial" panose="020B0604020202020204" pitchFamily="34" charset="0"/>
               </a:rPr>
               <a:t>References</a:t>
             </a:r>
-            <a:endParaRPr lang="en-GB" altLang="en-US" sz="3600">
+            <a:endParaRPr lang="en-GB" altLang="en-US" sz="3600" dirty="0">
               <a:cs typeface="Arial" panose="020B0604020202020204" pitchFamily="34" charset="0"/>
             </a:endParaRPr>
           </a:p>
@@ -6909,7 +6909,7 @@
               </a:lnSpc>
             </a:pPr>
             <a:r>
-              <a:rPr lang="en-GB" altLang="en-US" sz="1500">
+              <a:rPr lang="en-GB" altLang="en-US" sz="1500" dirty="0">
                 <a:cs typeface="Arial" panose="020B0604020202020204" pitchFamily="34" charset="0"/>
               </a:rPr>
               <a:t>Reference text size 15pt Arial and exactly 22pt space between lines</a:t>
@@ -6933,10 +6933,10 @@
         </p:nvGrpSpPr>
         <p:grpSpPr bwMode="auto">
           <a:xfrm>
-            <a:off x="28894087" y="4670619"/>
-            <a:ext cx="12885738" cy="1108075"/>
-            <a:chOff x="14894284" y="5068979"/>
-            <a:chExt cx="12887106" cy="1107996"/>
+            <a:off x="28963936" y="4724153"/>
+            <a:ext cx="12744000" cy="0"/>
+            <a:chOff x="14894284" y="5019598"/>
+            <a:chExt cx="13116061" cy="2030975"/>
           </a:xfrm>
         </p:grpSpPr>
         <p:sp>
@@ -6955,8 +6955,8 @@
           </p:nvSpPr>
           <p:spPr bwMode="auto">
             <a:xfrm>
-              <a:off x="14894284" y="5068979"/>
-              <a:ext cx="12887106" cy="1107996"/>
+              <a:off x="15123239" y="5425286"/>
+              <a:ext cx="12887106" cy="1625287"/>
             </a:xfrm>
             <a:prstGeom prst="rect">
               <a:avLst/>
@@ -7097,15 +7097,6 @@
               </a:lvl9pPr>
             </a:lstStyle>
             <a:p>
-              <a:r>
-                <a:rPr lang="en-GB" altLang="en-US" sz="6600" b="1" dirty="0">
-                  <a:solidFill>
-                    <a:srgbClr val="006684"/>
-                  </a:solidFill>
-                  <a:cs typeface="Arial" panose="020B0604020202020204" pitchFamily="34" charset="0"/>
-                </a:rPr>
-                <a:t>Conclusions</a:t>
-              </a:r>
               <a:endParaRPr lang="en-US" altLang="en-US" sz="6600" dirty="0">
                 <a:solidFill>
                   <a:srgbClr val="006684"/>
@@ -7131,7 +7122,7 @@
           </p:nvCxnSpPr>
           <p:spPr bwMode="auto">
             <a:xfrm flipV="1">
-              <a:off x="15019207" y="5195638"/>
+              <a:off x="14894284" y="5019598"/>
               <a:ext cx="12745514" cy="1"/>
             </a:xfrm>
             <a:prstGeom prst="line">
@@ -7172,8 +7163,8 @@
         </p:nvSpPr>
         <p:spPr bwMode="auto">
           <a:xfrm>
-            <a:off x="41274" y="126669"/>
-            <a:ext cx="42808525" cy="3437382"/>
+            <a:off x="96837" y="194896"/>
+            <a:ext cx="42919650" cy="3668420"/>
           </a:xfrm>
           <a:prstGeom prst="rect">
             <a:avLst/>
@@ -8363,8 +8354,8 @@
         </p:nvSpPr>
         <p:spPr>
           <a:xfrm>
-            <a:off x="14777864" y="6298547"/>
-            <a:ext cx="14419504" cy="8676000"/>
+            <a:off x="14690827" y="5860472"/>
+            <a:ext cx="14255648" cy="8424000"/>
           </a:xfrm>
           <a:prstGeom prst="rect">
             <a:avLst/>
@@ -8518,12 +8509,457 @@
           </a:p>
         </p:txBody>
       </p:sp>
+      <p:sp>
+        <p:nvSpPr>
+          <p:cNvPr id="24" name="TextBox 23">
+            <a:extLst>
+              <a:ext uri="{FF2B5EF4-FFF2-40B4-BE49-F238E27FC236}">
+                <a16:creationId xmlns:a16="http://schemas.microsoft.com/office/drawing/2014/main" id="{4E795EBD-F128-1EBD-75F2-D6C5BBE158DA}"/>
+              </a:ext>
+            </a:extLst>
+          </p:cNvPr>
+          <p:cNvSpPr txBox="1"/>
+          <p:nvPr/>
+        </p:nvSpPr>
+        <p:spPr>
+          <a:xfrm>
+            <a:off x="29186396" y="4932849"/>
+            <a:ext cx="12931646" cy="1107996"/>
+          </a:xfrm>
+          <a:prstGeom prst="rect">
+            <a:avLst/>
+          </a:prstGeom>
+          <a:noFill/>
+        </p:spPr>
+        <p:txBody>
+          <a:bodyPr wrap="square" rtlCol="0">
+            <a:spAutoFit/>
+          </a:bodyPr>
+          <a:lstStyle/>
+          <a:p>
+            <a:r>
+              <a:rPr lang="en-GB" sz="6600" b="1" dirty="0">
+                <a:solidFill>
+                  <a:srgbClr val="006684"/>
+                </a:solidFill>
+              </a:rPr>
+              <a:t>Ethical and  legal obligations</a:t>
+            </a:r>
+          </a:p>
+        </p:txBody>
+      </p:sp>
+      <p:sp>
+        <p:nvSpPr>
+          <p:cNvPr id="25" name="TextBox 24">
+            <a:extLst>
+              <a:ext uri="{FF2B5EF4-FFF2-40B4-BE49-F238E27FC236}">
+                <a16:creationId xmlns:a16="http://schemas.microsoft.com/office/drawing/2014/main" id="{D91089F9-6ABA-ECBC-2949-B27C664973BC}"/>
+              </a:ext>
+            </a:extLst>
+          </p:cNvPr>
+          <p:cNvSpPr txBox="1"/>
+          <p:nvPr/>
+        </p:nvSpPr>
+        <p:spPr>
+          <a:xfrm flipH="1">
+            <a:off x="29186396" y="5963591"/>
+            <a:ext cx="12306300" cy="7478970"/>
+          </a:xfrm>
+          <a:prstGeom prst="rect">
+            <a:avLst/>
+          </a:prstGeom>
+          <a:noFill/>
+        </p:spPr>
+        <p:txBody>
+          <a:bodyPr wrap="square" rtlCol="0">
+            <a:spAutoFit/>
+          </a:bodyPr>
+          <a:lstStyle/>
+          <a:p>
+            <a:r>
+              <a:rPr lang="en-GB" sz="3200" b="1" dirty="0"/>
+              <a:t>GDPR Compliance</a:t>
+            </a:r>
+          </a:p>
+          <a:p>
+            <a:pPr marL="342900" indent="-342900">
+              <a:buFont typeface="Arial" panose="020B0604020202020204" pitchFamily="34" charset="0"/>
+              <a:buChar char="•"/>
+            </a:pPr>
+            <a:r>
+              <a:rPr lang="en-GB" sz="3200" dirty="0"/>
+              <a:t>All data from the user must be stored securely and processed with consent.</a:t>
+            </a:r>
+          </a:p>
+          <a:p>
+            <a:pPr marL="342900" indent="-342900">
+              <a:buFont typeface="Arial" panose="020B0604020202020204" pitchFamily="34" charset="0"/>
+              <a:buChar char="•"/>
+            </a:pPr>
+            <a:r>
+              <a:rPr lang="en-GB" sz="3200" dirty="0"/>
+              <a:t>Must provide opt-in/opt-out mechanisms and support data erasure requests.</a:t>
+            </a:r>
+          </a:p>
+          <a:p>
+            <a:r>
+              <a:rPr lang="en-GB" sz="3200" b="1" dirty="0"/>
+              <a:t>Ethical Payment Processing.</a:t>
+            </a:r>
+          </a:p>
+          <a:p>
+            <a:pPr marL="342900" indent="-342900">
+              <a:buFont typeface="Arial" panose="020B0604020202020204" pitchFamily="34" charset="0"/>
+              <a:buChar char="•"/>
+            </a:pPr>
+            <a:r>
+              <a:rPr lang="en-GB" sz="3200" dirty="0"/>
+              <a:t>The use of PCI-DSS compliance gateways is mandatory.</a:t>
+            </a:r>
+          </a:p>
+          <a:p>
+            <a:pPr marL="342900" indent="-342900">
+              <a:buFont typeface="Arial" panose="020B0604020202020204" pitchFamily="34" charset="0"/>
+              <a:buChar char="•"/>
+            </a:pPr>
+            <a:r>
+              <a:rPr lang="en-GB" sz="3200" dirty="0"/>
+              <a:t>Data encryption in transit and at rest must be enforced</a:t>
+            </a:r>
+          </a:p>
+          <a:p>
+            <a:r>
+              <a:rPr lang="en-GB" sz="3200" b="1" dirty="0"/>
+              <a:t>Accessibility and Fair Use</a:t>
+            </a:r>
+            <a:r>
+              <a:rPr lang="en-GB" sz="3200" dirty="0"/>
+              <a:t>.</a:t>
+            </a:r>
+          </a:p>
+          <a:p>
+            <a:pPr marL="342900" indent="-342900">
+              <a:buFont typeface="Arial" panose="020B0604020202020204" pitchFamily="34" charset="0"/>
+              <a:buChar char="•"/>
+            </a:pPr>
+            <a:r>
+              <a:rPr lang="en-GB" sz="3200" dirty="0"/>
+              <a:t>UI/UX must support accessibility standards.</a:t>
+            </a:r>
+          </a:p>
+          <a:p>
+            <a:pPr marL="342900" indent="-342900">
+              <a:buFont typeface="Arial" panose="020B0604020202020204" pitchFamily="34" charset="0"/>
+              <a:buChar char="•"/>
+            </a:pPr>
+            <a:r>
+              <a:rPr lang="en-GB" sz="3200" dirty="0"/>
+              <a:t> The algorithm used for ticket allocation must be transparent and non-discriminatory.</a:t>
+            </a:r>
+          </a:p>
+          <a:p>
+            <a:r>
+              <a:rPr lang="en-GB" sz="3200" b="1" dirty="0"/>
+              <a:t>Security by design</a:t>
+            </a:r>
+          </a:p>
+          <a:p>
+            <a:pPr marL="342900" indent="-342900">
+              <a:buFont typeface="Arial" panose="020B0604020202020204" pitchFamily="34" charset="0"/>
+              <a:buChar char="•"/>
+            </a:pPr>
+            <a:r>
+              <a:rPr lang="en-GB" sz="3200" dirty="0"/>
+              <a:t>Regular penetration testing and audit logging</a:t>
+            </a:r>
+          </a:p>
+          <a:p>
+            <a:pPr marL="342900" indent="-342900">
+              <a:buFont typeface="Arial" panose="020B0604020202020204" pitchFamily="34" charset="0"/>
+              <a:buChar char="•"/>
+            </a:pPr>
+            <a:r>
+              <a:rPr lang="en-GB" sz="3200" dirty="0"/>
+              <a:t> A secure development lifecycle must be followed.</a:t>
+            </a:r>
+          </a:p>
+        </p:txBody>
+      </p:sp>
+      <p:grpSp>
+        <p:nvGrpSpPr>
+          <p:cNvPr id="28" name="Group 26">
+            <a:extLst>
+              <a:ext uri="{FF2B5EF4-FFF2-40B4-BE49-F238E27FC236}">
+                <a16:creationId xmlns:a16="http://schemas.microsoft.com/office/drawing/2014/main" id="{47955FC5-5B90-511B-BF7F-371ADD2F4C92}"/>
+              </a:ext>
+            </a:extLst>
+          </p:cNvPr>
+          <p:cNvGrpSpPr>
+            <a:grpSpLocks/>
+          </p:cNvGrpSpPr>
+          <p:nvPr/>
+        </p:nvGrpSpPr>
+        <p:grpSpPr bwMode="auto">
+          <a:xfrm>
+            <a:off x="896937" y="4724153"/>
+            <a:ext cx="13191257" cy="1652397"/>
+            <a:chOff x="1331601" y="16229020"/>
+            <a:chExt cx="12890641" cy="4008055"/>
+          </a:xfrm>
+        </p:grpSpPr>
+        <p:sp>
+          <p:nvSpPr>
+            <p:cNvPr id="29" name="Rectangle 249">
+              <a:extLst>
+                <a:ext uri="{FF2B5EF4-FFF2-40B4-BE49-F238E27FC236}">
+                  <a16:creationId xmlns:a16="http://schemas.microsoft.com/office/drawing/2014/main" id="{C05DE292-5627-8DF8-9241-750202D2BDD4}"/>
+                </a:ext>
+              </a:extLst>
+            </p:cNvPr>
+            <p:cNvSpPr>
+              <a:spLocks noChangeArrowheads="1"/>
+            </p:cNvSpPr>
+            <p:nvPr/>
+          </p:nvSpPr>
+          <p:spPr bwMode="auto">
+            <a:xfrm>
+              <a:off x="1331601" y="17549519"/>
+              <a:ext cx="12890641" cy="2687556"/>
+            </a:xfrm>
+            <a:prstGeom prst="rect">
+              <a:avLst/>
+            </a:prstGeom>
+            <a:noFill/>
+            <a:ln>
+              <a:noFill/>
+            </a:ln>
+            <a:extLst>
+              <a:ext uri="{909E8E84-426E-40DD-AFC4-6F175D3DCCD1}">
+                <a14:hiddenFill xmlns:a14="http://schemas.microsoft.com/office/drawing/2010/main">
+                  <a:solidFill>
+                    <a:srgbClr val="FFFFFF"/>
+                  </a:solidFill>
+                </a14:hiddenFill>
+              </a:ext>
+              <a:ext uri="{91240B29-F687-4F45-9708-019B960494DF}">
+                <a14:hiddenLine xmlns:a14="http://schemas.microsoft.com/office/drawing/2010/main" w="9525">
+                  <a:solidFill>
+                    <a:srgbClr val="000000"/>
+                  </a:solidFill>
+                  <a:miter lim="800000"/>
+                  <a:headEnd/>
+                  <a:tailEnd/>
+                </a14:hiddenLine>
+              </a:ext>
+            </a:extLst>
+          </p:spPr>
+          <p:txBody>
+            <a:bodyPr wrap="square">
+              <a:spAutoFit/>
+            </a:bodyPr>
+            <a:lstStyle>
+              <a:lvl1pPr>
+                <a:defRPr sz="2300">
+                  <a:solidFill>
+                    <a:schemeClr val="tx1"/>
+                  </a:solidFill>
+                  <a:latin typeface="Arial" panose="020B0604020202020204" pitchFamily="34" charset="0"/>
+                  <a:ea typeface="MS PGothic" panose="020B0600070205080204" pitchFamily="34" charset="-128"/>
+                </a:defRPr>
+              </a:lvl1pPr>
+              <a:lvl2pPr marL="742950" indent="-285750">
+                <a:defRPr sz="2300">
+                  <a:solidFill>
+                    <a:schemeClr val="tx1"/>
+                  </a:solidFill>
+                  <a:latin typeface="Arial" panose="020B0604020202020204" pitchFamily="34" charset="0"/>
+                  <a:ea typeface="MS PGothic" panose="020B0600070205080204" pitchFamily="34" charset="-128"/>
+                </a:defRPr>
+              </a:lvl2pPr>
+              <a:lvl3pPr marL="1143000" indent="-228600">
+                <a:defRPr sz="2300">
+                  <a:solidFill>
+                    <a:schemeClr val="tx1"/>
+                  </a:solidFill>
+                  <a:latin typeface="Arial" panose="020B0604020202020204" pitchFamily="34" charset="0"/>
+                  <a:ea typeface="MS PGothic" panose="020B0600070205080204" pitchFamily="34" charset="-128"/>
+                </a:defRPr>
+              </a:lvl3pPr>
+              <a:lvl4pPr marL="1600200" indent="-228600">
+                <a:defRPr sz="2300">
+                  <a:solidFill>
+                    <a:schemeClr val="tx1"/>
+                  </a:solidFill>
+                  <a:latin typeface="Arial" panose="020B0604020202020204" pitchFamily="34" charset="0"/>
+                  <a:ea typeface="MS PGothic" panose="020B0600070205080204" pitchFamily="34" charset="-128"/>
+                </a:defRPr>
+              </a:lvl4pPr>
+              <a:lvl5pPr marL="2057400" indent="-228600">
+                <a:defRPr sz="2300">
+                  <a:solidFill>
+                    <a:schemeClr val="tx1"/>
+                  </a:solidFill>
+                  <a:latin typeface="Arial" panose="020B0604020202020204" pitchFamily="34" charset="0"/>
+                  <a:ea typeface="MS PGothic" panose="020B0600070205080204" pitchFamily="34" charset="-128"/>
+                </a:defRPr>
+              </a:lvl5pPr>
+              <a:lvl6pPr marL="2514600" indent="-228600" eaLnBrk="0" fontAlgn="base" hangingPunct="0">
+                <a:spcBef>
+                  <a:spcPct val="0"/>
+                </a:spcBef>
+                <a:spcAft>
+                  <a:spcPct val="0"/>
+                </a:spcAft>
+                <a:defRPr sz="2300">
+                  <a:solidFill>
+                    <a:schemeClr val="tx1"/>
+                  </a:solidFill>
+                  <a:latin typeface="Arial" panose="020B0604020202020204" pitchFamily="34" charset="0"/>
+                  <a:ea typeface="MS PGothic" panose="020B0600070205080204" pitchFamily="34" charset="-128"/>
+                </a:defRPr>
+              </a:lvl6pPr>
+              <a:lvl7pPr marL="2971800" indent="-228600" eaLnBrk="0" fontAlgn="base" hangingPunct="0">
+                <a:spcBef>
+                  <a:spcPct val="0"/>
+                </a:spcBef>
+                <a:spcAft>
+                  <a:spcPct val="0"/>
+                </a:spcAft>
+                <a:defRPr sz="2300">
+                  <a:solidFill>
+                    <a:schemeClr val="tx1"/>
+                  </a:solidFill>
+                  <a:latin typeface="Arial" panose="020B0604020202020204" pitchFamily="34" charset="0"/>
+                  <a:ea typeface="MS PGothic" panose="020B0600070205080204" pitchFamily="34" charset="-128"/>
+                </a:defRPr>
+              </a:lvl7pPr>
+              <a:lvl8pPr marL="3429000" indent="-228600" eaLnBrk="0" fontAlgn="base" hangingPunct="0">
+                <a:spcBef>
+                  <a:spcPct val="0"/>
+                </a:spcBef>
+                <a:spcAft>
+                  <a:spcPct val="0"/>
+                </a:spcAft>
+                <a:defRPr sz="2300">
+                  <a:solidFill>
+                    <a:schemeClr val="tx1"/>
+                  </a:solidFill>
+                  <a:latin typeface="Arial" panose="020B0604020202020204" pitchFamily="34" charset="0"/>
+                  <a:ea typeface="MS PGothic" panose="020B0600070205080204" pitchFamily="34" charset="-128"/>
+                </a:defRPr>
+              </a:lvl8pPr>
+              <a:lvl9pPr marL="3886200" indent="-228600" eaLnBrk="0" fontAlgn="base" hangingPunct="0">
+                <a:spcBef>
+                  <a:spcPct val="0"/>
+                </a:spcBef>
+                <a:spcAft>
+                  <a:spcPct val="0"/>
+                </a:spcAft>
+                <a:defRPr sz="2300">
+                  <a:solidFill>
+                    <a:schemeClr val="tx1"/>
+                  </a:solidFill>
+                  <a:latin typeface="Arial" panose="020B0604020202020204" pitchFamily="34" charset="0"/>
+                  <a:ea typeface="MS PGothic" panose="020B0600070205080204" pitchFamily="34" charset="-128"/>
+                </a:defRPr>
+              </a:lvl9pPr>
+            </a:lstStyle>
+            <a:p>
+              <a:endParaRPr lang="en-US" altLang="en-US" sz="6600" dirty="0">
+                <a:solidFill>
+                  <a:srgbClr val="006684"/>
+                </a:solidFill>
+                <a:cs typeface="Arial" panose="020B0604020202020204" pitchFamily="34" charset="0"/>
+              </a:endParaRPr>
+            </a:p>
+          </p:txBody>
+        </p:sp>
+        <p:cxnSp>
+          <p:nvCxnSpPr>
+            <p:cNvPr id="30" name="Straight Connector 6">
+              <a:extLst>
+                <a:ext uri="{FF2B5EF4-FFF2-40B4-BE49-F238E27FC236}">
+                  <a16:creationId xmlns:a16="http://schemas.microsoft.com/office/drawing/2014/main" id="{AF476BBC-753F-CB09-78F0-3E8FD835825A}"/>
+                </a:ext>
+              </a:extLst>
+            </p:cNvPr>
+            <p:cNvCxnSpPr>
+              <a:cxnSpLocks noChangeShapeType="1"/>
+            </p:cNvCxnSpPr>
+            <p:nvPr/>
+          </p:nvCxnSpPr>
+          <p:spPr bwMode="auto">
+            <a:xfrm flipV="1">
+              <a:off x="1346021" y="16229020"/>
+              <a:ext cx="12745514" cy="0"/>
+            </a:xfrm>
+            <a:prstGeom prst="line">
+              <a:avLst/>
+            </a:prstGeom>
+            <a:noFill/>
+            <a:ln w="12700">
+              <a:solidFill>
+                <a:srgbClr val="006684"/>
+              </a:solidFill>
+              <a:round/>
+              <a:headEnd/>
+              <a:tailEnd/>
+            </a:ln>
+            <a:extLst>
+              <a:ext uri="{909E8E84-426E-40DD-AFC4-6F175D3DCCD1}">
+                <a14:hiddenFill xmlns:a14="http://schemas.microsoft.com/office/drawing/2010/main">
+                  <a:noFill/>
+                </a14:hiddenFill>
+              </a:ext>
+            </a:extLst>
+          </p:spPr>
+        </p:cxnSp>
+      </p:grpSp>
+      <p:sp>
+        <p:nvSpPr>
+          <p:cNvPr id="31" name="TextBox 30">
+            <a:extLst>
+              <a:ext uri="{FF2B5EF4-FFF2-40B4-BE49-F238E27FC236}">
+                <a16:creationId xmlns:a16="http://schemas.microsoft.com/office/drawing/2014/main" id="{9C855503-F258-DB4E-8491-1724CAEA7DAB}"/>
+              </a:ext>
+            </a:extLst>
+          </p:cNvPr>
+          <p:cNvSpPr txBox="1"/>
+          <p:nvPr/>
+        </p:nvSpPr>
+        <p:spPr>
+          <a:xfrm>
+            <a:off x="29386088" y="13558193"/>
+            <a:ext cx="11961812" cy="1107996"/>
+          </a:xfrm>
+          <a:prstGeom prst="rect">
+            <a:avLst/>
+          </a:prstGeom>
+          <a:noFill/>
+        </p:spPr>
+        <p:txBody>
+          <a:bodyPr wrap="square" rtlCol="0">
+            <a:spAutoFit/>
+          </a:bodyPr>
+          <a:lstStyle/>
+          <a:p>
+            <a:r>
+              <a:rPr lang="en-GB" sz="6600" b="1" dirty="0">
+                <a:solidFill>
+                  <a:srgbClr val="006684"/>
+                </a:solidFill>
+              </a:rPr>
+              <a:t>Conclusion:</a:t>
+            </a:r>
+          </a:p>
+        </p:txBody>
+      </p:sp>
       <p:pic>
         <p:nvPicPr>
-          <p:cNvPr id="20" name="Picture 19">
+          <p:cNvPr id="14341" name="Picture 14340">
             <a:extLst>
               <a:ext uri="{FF2B5EF4-FFF2-40B4-BE49-F238E27FC236}">
-                <a16:creationId xmlns:a16="http://schemas.microsoft.com/office/drawing/2014/main" id="{5D51AB02-D71C-31E7-BBBF-1FD46017191C}"/>
+                <a16:creationId xmlns:a16="http://schemas.microsoft.com/office/drawing/2014/main" id="{0405A969-7C6C-2DA8-08B0-E1FF03905F75}"/>
               </a:ext>
             </a:extLst>
           </p:cNvPr>
@@ -8540,12 +8976,123 @@
         </p:blipFill>
         <p:spPr>
           <a:xfrm>
-            <a:off x="15109825" y="15051681"/>
-            <a:ext cx="12452884" cy="7872277"/>
+            <a:off x="14978751" y="14611351"/>
+            <a:ext cx="12389749" cy="7966392"/>
           </a:xfrm>
           <a:prstGeom prst="rect">
             <a:avLst/>
           </a:prstGeom>
+        </p:spPr>
+      </p:pic>
+      <p:sp>
+        <p:nvSpPr>
+          <p:cNvPr id="14342" name="TextBox 14341">
+            <a:extLst>
+              <a:ext uri="{FF2B5EF4-FFF2-40B4-BE49-F238E27FC236}">
+                <a16:creationId xmlns:a16="http://schemas.microsoft.com/office/drawing/2014/main" id="{DD98F5C0-BDE7-9DCA-CF4F-5867349E6CC1}"/>
+              </a:ext>
+            </a:extLst>
+          </p:cNvPr>
+          <p:cNvSpPr txBox="1"/>
+          <p:nvPr/>
+        </p:nvSpPr>
+        <p:spPr>
+          <a:xfrm>
+            <a:off x="29431869" y="14890990"/>
+            <a:ext cx="11677086" cy="5078313"/>
+          </a:xfrm>
+          <a:prstGeom prst="rect">
+            <a:avLst/>
+          </a:prstGeom>
+          <a:noFill/>
+        </p:spPr>
+        <p:txBody>
+          <a:bodyPr wrap="square" rtlCol="0">
+            <a:spAutoFit/>
+          </a:bodyPr>
+          <a:lstStyle/>
+          <a:p>
+            <a:r>
+              <a:rPr lang="en-GB" sz="3600" dirty="0"/>
+              <a:t>The Spring Boot framework's Microservices Architecture and MVC model are suitable for the "Festivals R Us" ticket sales application. It ensures scalability, security, flexibility, and availability, which are critical for high-volume transactions. By complying with GDPR and PCI DSS, the platform will protect user privacy, meet regulatory obligations, and maintain consumer trust while providing a secure, efficient user experience across multiple devices.</a:t>
+            </a:r>
+          </a:p>
+        </p:txBody>
+      </p:sp>
+      <p:pic>
+        <p:nvPicPr>
+          <p:cNvPr id="3113" name="Picture 41">
+            <a:extLst>
+              <a:ext uri="{FF2B5EF4-FFF2-40B4-BE49-F238E27FC236}">
+                <a16:creationId xmlns:a16="http://schemas.microsoft.com/office/drawing/2014/main" id="{0BAE447B-333B-2529-C554-AD315C3F3114}"/>
+              </a:ext>
+            </a:extLst>
+          </p:cNvPr>
+          <p:cNvPicPr>
+            <a:picLocks noChangeAspect="1" noChangeArrowheads="1"/>
+          </p:cNvPicPr>
+          <p:nvPr/>
+        </p:nvPicPr>
+        <p:blipFill>
+          <a:blip r:embed="rId4">
+            <a:extLst>
+              <a:ext uri="{28A0092B-C50C-407E-A947-70E740481C1C}">
+                <a14:useLocalDpi xmlns:a14="http://schemas.microsoft.com/office/drawing/2010/main" val="0"/>
+              </a:ext>
+            </a:extLst>
+          </a:blip>
+          <a:srcRect/>
+          <a:stretch>
+            <a:fillRect/>
+          </a:stretch>
+        </p:blipFill>
+        <p:spPr bwMode="auto">
+          <a:xfrm>
+            <a:off x="444109" y="431851"/>
+            <a:ext cx="10568448" cy="3298732"/>
+          </a:xfrm>
+          <a:prstGeom prst="rect">
+            <a:avLst/>
+          </a:prstGeom>
+          <a:solidFill>
+            <a:srgbClr val="FFFFFF">
+              <a:shade val="85000"/>
+            </a:srgbClr>
+          </a:solidFill>
+          <a:ln w="88900" cap="sq">
+            <a:solidFill>
+              <a:srgbClr val="FFFFFF"/>
+            </a:solidFill>
+            <a:miter lim="800000"/>
+          </a:ln>
+          <a:effectLst>
+            <a:outerShdw blurRad="55000" dist="18000" dir="5400000" algn="tl" rotWithShape="0">
+              <a:srgbClr val="000000">
+                <a:alpha val="40000"/>
+              </a:srgbClr>
+            </a:outerShdw>
+          </a:effectLst>
+          <a:scene3d>
+            <a:camera prst="orthographicFront"/>
+            <a:lightRig rig="twoPt" dir="t">
+              <a:rot lat="0" lon="0" rev="7200000"/>
+            </a:lightRig>
+          </a:scene3d>
+          <a:sp3d>
+            <a:bevelT w="25400" h="19050"/>
+            <a:contourClr>
+              <a:srgbClr val="FFFFFF"/>
+            </a:contourClr>
+          </a:sp3d>
+          <a:extLst>
+            <a:ext uri="{909E8E84-426E-40DD-AFC4-6F175D3DCCD1}">
+              <a14:hiddenFill xmlns:a14="http://schemas.microsoft.com/office/drawing/2010/main">
+                <a:solidFill>
+                  <a:srgbClr val="FFFFFF"/>
+                </a:solidFill>
+              </a14:hiddenFill>
+            </a:ext>
+          </a:extLst>
         </p:spPr>
       </p:pic>
     </p:spTree>

</xml_diff>